<commit_message>
Site changed (Süleyman Mert ALMALI) 2
</commit_message>
<xml_diff>
--- a/docs/week-1/week-1.en.md_word.pptx
+++ b/docs/week-1/week-1.en.md_word.pptx
@@ -4,7 +4,19 @@
   <p:sldMasterIdLst>
     <p:sldMasterId id="2147483648" r:id="rId1"/>
   </p:sldMasterIdLst>
-  <p:sldIdLst/>
+  <p:sldIdLst>
+    <p:sldId id="256" r:id="rId2"/>
+    <p:sldId id="257" r:id="rId3"/>
+    <p:sldId id="258" r:id="rId4"/>
+    <p:sldId id="259" r:id="rId5"/>
+    <p:sldId id="260" r:id="rId6"/>
+    <p:sldId id="261" r:id="rId7"/>
+    <p:sldId id="262" r:id="rId8"/>
+    <p:sldId id="263" r:id="rId9"/>
+    <p:sldId id="264" r:id="rId10"/>
+    <p:sldId id="265" r:id="rId11"/>
+    <p:sldId id="266" r:id="rId12"/>
+  </p:sldIdLst>
   <p:sldSz cx="9144000" cy="5143500" type="screen16x9"/>
   <p:notesSz cx="6858000" cy="9144000"/>
   <p:defaultTextStyle>
@@ -3069,6 +3081,988 @@
     </p:otherStyle>
   </p:txStyles>
 </p:sldMaster>
+</file>
+
+<file path=ppt/slides/slide1.xml><?xml version="1.0" encoding="utf-8"?>
+<p:sld xmlns:a="http://schemas.openxmlformats.org/drawingml/2006/main" xmlns:r="http://schemas.openxmlformats.org/officeDocument/2006/relationships" xmlns:p="http://schemas.openxmlformats.org/presentationml/2006/main">
+  <p:cSld>
+    <p:spTree>
+      <p:nvGrpSpPr>
+        <p:cNvPr id="1" name=""/>
+        <p:cNvGrpSpPr/>
+        <p:nvPr/>
+      </p:nvGrpSpPr>
+      <p:grpSpPr>
+        <a:xfrm>
+          <a:off x="0" y="0"/>
+          <a:ext cx="0" cy="0"/>
+          <a:chOff x="0" y="0"/>
+          <a:chExt cx="0" cy="0"/>
+        </a:xfrm>
+      </p:grpSpPr>
+      <p:sp>
+        <p:nvSpPr>
+          <p:cNvPr id="2" name="Title 1"/>
+          <p:cNvSpPr>
+            <a:spLocks noGrp="1"/>
+          </p:cNvSpPr>
+          <p:nvPr>
+            <p:ph type="ctrTitle"/>
+          </p:nvPr>
+        </p:nvSpPr>
+        <p:spPr>
+          <a:xfrm>
+            <a:off x="685800" y="1597819"/>
+            <a:ext cx="7772400" cy="1102519"/>
+          </a:xfrm>
+        </p:spPr>
+        <p:txBody>
+          <a:bodyPr/>
+          <a:lstStyle/>
+          <a:p>
+            <a:pPr lvl="0" indent="0" marL="0">
+              <a:buNone/>
+            </a:pPr>
+            <a:r>
+              <a:rPr/>
+              <a:t>What is Computer Enginnering?</a:t>
+            </a:r>
+          </a:p>
+        </p:txBody>
+      </p:sp>
+      <p:sp>
+        <p:nvSpPr>
+          <p:cNvPr id="3" name="Subtitle 2"/>
+          <p:cNvSpPr>
+            <a:spLocks noGrp="1"/>
+          </p:cNvSpPr>
+          <p:nvPr>
+            <p:ph idx="1" type="subTitle"/>
+          </p:nvPr>
+        </p:nvSpPr>
+        <p:spPr>
+          <a:xfrm>
+            <a:off x="1371600" y="2914650"/>
+            <a:ext cx="6400800" cy="1314450"/>
+          </a:xfrm>
+        </p:spPr>
+        <p:txBody>
+          <a:bodyPr/>
+          <a:lstStyle/>
+          <a:p>
+            <a:pPr lvl="0" indent="0" marL="0">
+              <a:buNone/>
+            </a:pPr>
+            <a:r>
+              <a:rPr/>
+              <a:t>Sample Course Module Name</a:t>
+            </a:r>
+            <a:br/>
+            <a:br/>
+            <a:r>
+              <a:rPr/>
+              <a:t>Author: Süleyman Mert ALMALI</a:t>
+            </a:r>
+          </a:p>
+        </p:txBody>
+      </p:sp>
+      <p:sp>
+        <p:nvSpPr>
+          <p:cNvPr id="4" name="Date Placeholder 3"/>
+          <p:cNvSpPr>
+            <a:spLocks noGrp="1"/>
+          </p:cNvSpPr>
+          <p:nvPr>
+            <p:ph idx="10" sz="half" type="dt"/>
+          </p:nvPr>
+        </p:nvSpPr>
+        <p:spPr/>
+        <p:txBody>
+          <a:bodyPr/>
+          <a:lstStyle/>
+          <a:p>
+            <a:pPr lvl="0" indent="0" marL="0">
+              <a:buNone/>
+            </a:pPr>
+            <a:r>
+              <a:rPr/>
+              <a:t/>
+            </a:r>
+          </a:p>
+        </p:txBody>
+      </p:sp>
+    </p:spTree>
+  </p:cSld>
+</p:sld>
+</file>
+
+<file path=ppt/slides/slide10.xml><?xml version="1.0" encoding="utf-8"?>
+<p:sld xmlns:a="http://schemas.openxmlformats.org/drawingml/2006/main" xmlns:r="http://schemas.openxmlformats.org/officeDocument/2006/relationships" xmlns:p="http://schemas.openxmlformats.org/presentationml/2006/main">
+  <p:cSld>
+    <p:spTree>
+      <p:nvGrpSpPr>
+        <p:cNvPr id="1" name=""/>
+        <p:cNvGrpSpPr/>
+        <p:nvPr/>
+      </p:nvGrpSpPr>
+      <p:grpSpPr>
+        <a:xfrm>
+          <a:off x="0" y="0"/>
+          <a:ext cx="0" cy="0"/>
+          <a:chOff x="0" y="0"/>
+          <a:chExt cx="0" cy="0"/>
+        </a:xfrm>
+      </p:grpSpPr>
+      <p:sp>
+        <p:nvSpPr>
+          <p:cNvPr id="4" name="Text Placeholder 3"/>
+          <p:cNvSpPr>
+            <a:spLocks noGrp="1"/>
+          </p:cNvSpPr>
+          <p:nvPr>
+            <p:ph idx="2" sz="half" type="body"/>
+          </p:nvPr>
+        </p:nvSpPr>
+        <p:spPr/>
+        <p:txBody>
+          <a:bodyPr/>
+          <a:lstStyle/>
+          <a:p>
+            <a:pPr lvl="0" indent="0" marL="0">
+              <a:spcBef>
+                <a:spcPts val="3000"/>
+              </a:spcBef>
+              <a:buNone/>
+            </a:pPr>
+            <a:r>
+              <a:rPr b="1"/>
+              <a:t>What Job Title Do They Work in?</a:t>
+            </a:r>
+          </a:p>
+          <a:p>
+            <a:pPr lvl="0"/>
+            <a:r>
+              <a:rPr b="1"/>
+              <a:t>Canada and Turkey Comparative Table</a:t>
+            </a:r>
+            <a:r>
+              <a:rPr/>
+              <a:t> Compared to Canada, we see more people working as computer engineers in Turkey. This shows that it would be more beneficial to develop in the field of computer engineering for those who want to work in Turkey.</a:t>
+            </a:r>
+          </a:p>
+        </p:txBody>
+      </p:sp>
+      <p:pic>
+        <p:nvPicPr>
+          <p:cNvPr descr="fig:  assets/grafik1.jpg" id="0" name="Picture 1"/>
+          <p:cNvPicPr>
+            <a:picLocks noGrp="1" noChangeAspect="1"/>
+          </p:cNvPicPr>
+          <p:nvPr/>
+        </p:nvPicPr>
+        <p:blipFill>
+          <a:blip r:embed="rId2"/>
+          <a:stretch>
+            <a:fillRect/>
+          </a:stretch>
+        </p:blipFill>
+        <p:spPr bwMode="auto">
+          <a:xfrm>
+            <a:off x="3568700" y="850900"/>
+            <a:ext cx="5105400" cy="2578100"/>
+          </a:xfrm>
+          <a:prstGeom prst="rect">
+            <a:avLst/>
+          </a:prstGeom>
+          <a:noFill/>
+          <a:ln w="9525">
+            <a:noFill/>
+            <a:headEnd/>
+            <a:tailEnd/>
+          </a:ln>
+        </p:spPr>
+      </p:pic>
+      <p:sp>
+        <p:nvSpPr>
+          <p:cNvPr id="1" name="TextBox 3"/>
+          <p:cNvSpPr txBox="1"/>
+          <p:nvPr/>
+        </p:nvSpPr>
+        <p:spPr>
+          <a:xfrm>
+            <a:off x="3568700" y="4076700"/>
+            <a:ext cx="5105400" cy="508000"/>
+          </a:xfrm>
+          <a:prstGeom prst="rect">
+            <a:avLst/>
+          </a:prstGeom>
+          <a:noFill/>
+        </p:spPr>
+        <p:txBody>
+          <a:bodyPr/>
+          <a:lstStyle/>
+          <a:p>
+            <a:pPr lvl="0" indent="0" marL="0" algn="ctr">
+              <a:buNone/>
+            </a:pPr>
+            <a:r>
+              <a:rPr/>
+              <a:t>bg left:50% w:600px h:300px</a:t>
+            </a:r>
+          </a:p>
+        </p:txBody>
+      </p:sp>
+    </p:spTree>
+  </p:cSld>
+</p:sld>
+</file>
+
+<file path=ppt/slides/slide11.xml><?xml version="1.0" encoding="utf-8"?>
+<p:sld xmlns:a="http://schemas.openxmlformats.org/drawingml/2006/main" xmlns:r="http://schemas.openxmlformats.org/officeDocument/2006/relationships" xmlns:p="http://schemas.openxmlformats.org/presentationml/2006/main">
+  <p:cSld>
+    <p:spTree>
+      <p:nvGrpSpPr>
+        <p:cNvPr id="1" name=""/>
+        <p:cNvGrpSpPr/>
+        <p:nvPr/>
+      </p:nvGrpSpPr>
+      <p:grpSpPr>
+        <a:xfrm>
+          <a:off x="0" y="0"/>
+          <a:ext cx="0" cy="0"/>
+          <a:chOff x="0" y="0"/>
+          <a:chExt cx="0" cy="0"/>
+        </a:xfrm>
+      </p:grpSpPr>
+      <p:sp>
+        <p:nvSpPr>
+          <p:cNvPr id="2" name="Title 1"/>
+          <p:cNvSpPr>
+            <a:spLocks noGrp="1"/>
+          </p:cNvSpPr>
+          <p:nvPr>
+            <p:ph type="title"/>
+          </p:nvPr>
+        </p:nvSpPr>
+        <p:spPr/>
+        <p:txBody>
+          <a:bodyPr/>
+          <a:lstStyle/>
+          <a:p>
+            <a:pPr lvl="0" indent="0" marL="0">
+              <a:buNone/>
+            </a:pPr>
+            <a:r>
+              <a:rPr/>
+              <a:t>References</a:t>
+            </a:r>
+          </a:p>
+        </p:txBody>
+      </p:sp>
+      <p:sp>
+        <p:nvSpPr>
+          <p:cNvPr id="3" name="Content Placeholder 2"/>
+          <p:cNvSpPr>
+            <a:spLocks noGrp="1"/>
+          </p:cNvSpPr>
+          <p:nvPr>
+            <p:ph idx="1"/>
+          </p:nvPr>
+        </p:nvSpPr>
+        <p:spPr/>
+        <p:txBody>
+          <a:bodyPr/>
+          <a:lstStyle/>
+          <a:p>
+            <a:pPr lvl="0"/>
+            <a:r>
+              <a:rPr/>
+              <a:t>http://www.cs.bilkent.edu.tr/data/bilgisayartanitim.pdf</a:t>
+            </a:r>
+          </a:p>
+          <a:p>
+            <a:pPr lvl="0"/>
+            <a:r>
+              <a:rPr/>
+              <a:t>https://www.sciencedirect.com/science/article/abs/pii/S0164121215001314</a:t>
+            </a:r>
+          </a:p>
+          <a:p>
+            <a:pPr lvl="0"/>
+            <a:r>
+              <a:rPr/>
+              <a:t>https://www.etu.edu.tr/tr/bolum/bilgisayar-muhendisligi?pgNb=9</a:t>
+            </a:r>
+          </a:p>
+        </p:txBody>
+      </p:sp>
+    </p:spTree>
+  </p:cSld>
+</p:sld>
+</file>
+
+<file path=ppt/slides/slide2.xml><?xml version="1.0" encoding="utf-8"?>
+<p:sld xmlns:a="http://schemas.openxmlformats.org/drawingml/2006/main" xmlns:r="http://schemas.openxmlformats.org/officeDocument/2006/relationships" xmlns:p="http://schemas.openxmlformats.org/presentationml/2006/main">
+  <p:cSld>
+    <p:spTree>
+      <p:nvGrpSpPr>
+        <p:cNvPr id="1" name=""/>
+        <p:cNvGrpSpPr/>
+        <p:nvPr/>
+      </p:nvGrpSpPr>
+      <p:grpSpPr>
+        <a:xfrm>
+          <a:off x="0" y="0"/>
+          <a:ext cx="0" cy="0"/>
+          <a:chOff x="0" y="0"/>
+          <a:chExt cx="0" cy="0"/>
+        </a:xfrm>
+      </p:grpSpPr>
+      <p:sp>
+        <p:nvSpPr>
+          <p:cNvPr id="2" name="Title 1"/>
+          <p:cNvSpPr>
+            <a:spLocks noGrp="1"/>
+          </p:cNvSpPr>
+          <p:nvPr>
+            <p:ph type="title"/>
+          </p:nvPr>
+        </p:nvSpPr>
+        <p:spPr>
+          <a:xfrm>
+            <a:off x="722313" y="3305176"/>
+            <a:ext cx="7772400" cy="1021556"/>
+          </a:xfrm>
+        </p:spPr>
+        <p:txBody>
+          <a:bodyPr/>
+          <a:lstStyle/>
+          <a:p>
+            <a:pPr lvl="0" indent="0" marL="0">
+              <a:buNone/>
+            </a:pPr>
+            <a:r>
+              <a:rPr/>
+              <a:t>Job Description (Computer Engineering)</a:t>
+            </a:r>
+          </a:p>
+        </p:txBody>
+      </p:sp>
+    </p:spTree>
+  </p:cSld>
+</p:sld>
+</file>
+
+<file path=ppt/slides/slide3.xml><?xml version="1.0" encoding="utf-8"?>
+<p:sld xmlns:a="http://schemas.openxmlformats.org/drawingml/2006/main" xmlns:r="http://schemas.openxmlformats.org/officeDocument/2006/relationships" xmlns:p="http://schemas.openxmlformats.org/presentationml/2006/main">
+  <p:cSld>
+    <p:spTree>
+      <p:nvGrpSpPr>
+        <p:cNvPr id="1" name=""/>
+        <p:cNvGrpSpPr/>
+        <p:nvPr/>
+      </p:nvGrpSpPr>
+      <p:grpSpPr>
+        <a:xfrm>
+          <a:off x="0" y="0"/>
+          <a:ext cx="0" cy="0"/>
+          <a:chOff x="0" y="0"/>
+          <a:chExt cx="0" cy="0"/>
+        </a:xfrm>
+      </p:grpSpPr>
+      <p:sp>
+        <p:nvSpPr>
+          <p:cNvPr id="3" name="Content Placeholder 2"/>
+          <p:cNvSpPr>
+            <a:spLocks noGrp="1"/>
+          </p:cNvSpPr>
+          <p:nvPr>
+            <p:ph idx="1"/>
+          </p:nvPr>
+        </p:nvSpPr>
+        <p:spPr/>
+        <p:txBody>
+          <a:bodyPr/>
+          <a:lstStyle/>
+          <a:p>
+            <a:pPr lvl="0" indent="0" marL="0">
+              <a:spcBef>
+                <a:spcPts val="3000"/>
+              </a:spcBef>
+              <a:buNone/>
+            </a:pPr>
+            <a:r>
+              <a:rPr b="1"/>
+              <a:t>Fall semester, 2022-2023</a:t>
+            </a:r>
+          </a:p>
+          <a:p>
+            <a:pPr lvl="0" indent="0" marL="0">
+              <a:buNone/>
+            </a:pPr>
+            <a:r>
+              <a:rPr/>
+              <a:t>Download </a:t>
+            </a:r>
+            <a:r>
+              <a:rPr>
+                <a:hlinkClick r:id="rId2"/>
+              </a:rPr>
+              <a:t>DOC</a:t>
+            </a:r>
+            <a:r>
+              <a:rPr/>
+              <a:t>, </a:t>
+            </a:r>
+            <a:r>
+              <a:rPr>
+                <a:hlinkClick r:id="rId3"/>
+              </a:rPr>
+              <a:t>SLIDE</a:t>
+            </a:r>
+            <a:r>
+              <a:rPr/>
+              <a:t>, </a:t>
+            </a:r>
+            <a:r>
+              <a:rPr>
+                <a:hlinkClick r:id="rId4"/>
+              </a:rPr>
+              <a:t>PPTX</a:t>
+            </a:r>
+          </a:p>
+        </p:txBody>
+      </p:sp>
+    </p:spTree>
+  </p:cSld>
+</p:sld>
+</file>
+
+<file path=ppt/slides/slide4.xml><?xml version="1.0" encoding="utf-8"?>
+<p:sld xmlns:a="http://schemas.openxmlformats.org/drawingml/2006/main" xmlns:r="http://schemas.openxmlformats.org/officeDocument/2006/relationships" xmlns:p="http://schemas.openxmlformats.org/presentationml/2006/main">
+  <p:cSld>
+    <p:spTree>
+      <p:nvGrpSpPr>
+        <p:cNvPr id="1" name=""/>
+        <p:cNvGrpSpPr/>
+        <p:nvPr/>
+      </p:nvGrpSpPr>
+      <p:grpSpPr>
+        <a:xfrm>
+          <a:off x="0" y="0"/>
+          <a:ext cx="0" cy="0"/>
+          <a:chOff x="0" y="0"/>
+          <a:chExt cx="0" cy="0"/>
+        </a:xfrm>
+      </p:grpSpPr>
+      <p:sp>
+        <p:nvSpPr>
+          <p:cNvPr id="2" name="Title 1"/>
+          <p:cNvSpPr>
+            <a:spLocks noGrp="1"/>
+          </p:cNvSpPr>
+          <p:nvPr>
+            <p:ph type="title"/>
+          </p:nvPr>
+        </p:nvSpPr>
+        <p:spPr/>
+        <p:txBody>
+          <a:bodyPr/>
+          <a:lstStyle/>
+          <a:p>
+            <a:pPr lvl="0" indent="0" marL="0">
+              <a:buNone/>
+            </a:pPr>
+            <a:r>
+              <a:rPr/>
+              <a:t>What is Computer Engineering</a:t>
+            </a:r>
+          </a:p>
+        </p:txBody>
+      </p:sp>
+      <p:sp>
+        <p:nvSpPr>
+          <p:cNvPr id="3" name="Content Placeholder 2"/>
+          <p:cNvSpPr>
+            <a:spLocks noGrp="1"/>
+          </p:cNvSpPr>
+          <p:nvPr>
+            <p:ph idx="1"/>
+          </p:nvPr>
+        </p:nvSpPr>
+        <p:spPr/>
+        <p:txBody>
+          <a:bodyPr/>
+          <a:lstStyle/>
+          <a:p>
+            <a:pPr lvl="0"/>
+            <a:r>
+              <a:rPr/>
+              <a:t>Based on Computer Science theory, computers anything that can help and make our life easier. hardware, software, networks, security components, databases, etc. systems with answers science produces.</a:t>
+            </a:r>
+          </a:p>
+        </p:txBody>
+      </p:sp>
+    </p:spTree>
+  </p:cSld>
+</p:sld>
+</file>
+
+<file path=ppt/slides/slide5.xml><?xml version="1.0" encoding="utf-8"?>
+<p:sld xmlns:a="http://schemas.openxmlformats.org/drawingml/2006/main" xmlns:r="http://schemas.openxmlformats.org/officeDocument/2006/relationships" xmlns:p="http://schemas.openxmlformats.org/presentationml/2006/main">
+  <p:cSld>
+    <p:spTree>
+      <p:nvGrpSpPr>
+        <p:cNvPr id="1" name=""/>
+        <p:cNvGrpSpPr/>
+        <p:nvPr/>
+      </p:nvGrpSpPr>
+      <p:grpSpPr>
+        <a:xfrm>
+          <a:off x="0" y="0"/>
+          <a:ext cx="0" cy="0"/>
+          <a:chOff x="0" y="0"/>
+          <a:chExt cx="0" cy="0"/>
+        </a:xfrm>
+      </p:grpSpPr>
+      <p:sp>
+        <p:nvSpPr>
+          <p:cNvPr id="2" name="Title 1"/>
+          <p:cNvSpPr>
+            <a:spLocks noGrp="1"/>
+          </p:cNvSpPr>
+          <p:nvPr>
+            <p:ph type="title"/>
+          </p:nvPr>
+        </p:nvSpPr>
+        <p:spPr>
+          <a:xfrm>
+            <a:off x="722313" y="3305176"/>
+            <a:ext cx="7772400" cy="1021556"/>
+          </a:xfrm>
+        </p:spPr>
+        <p:txBody>
+          <a:bodyPr/>
+          <a:lstStyle/>
+          <a:p>
+            <a:pPr lvl="0" indent="0" marL="0">
+              <a:buNone/>
+            </a:pPr>
+            <a:r>
+              <a:rPr i="1"/>
+              <a:t>What Does a Computer Engineer Do?</a:t>
+            </a:r>
+          </a:p>
+        </p:txBody>
+      </p:sp>
+    </p:spTree>
+  </p:cSld>
+</p:sld>
+</file>
+
+<file path=ppt/slides/slide6.xml><?xml version="1.0" encoding="utf-8"?>
+<p:sld xmlns:a="http://schemas.openxmlformats.org/drawingml/2006/main" xmlns:r="http://schemas.openxmlformats.org/officeDocument/2006/relationships" xmlns:p="http://schemas.openxmlformats.org/presentationml/2006/main">
+  <p:cSld>
+    <p:spTree>
+      <p:nvGrpSpPr>
+        <p:cNvPr id="1" name=""/>
+        <p:cNvGrpSpPr/>
+        <p:nvPr/>
+      </p:nvGrpSpPr>
+      <p:grpSpPr>
+        <a:xfrm>
+          <a:off x="0" y="0"/>
+          <a:ext cx="0" cy="0"/>
+          <a:chOff x="0" y="0"/>
+          <a:chExt cx="0" cy="0"/>
+        </a:xfrm>
+      </p:grpSpPr>
+      <p:sp>
+        <p:nvSpPr>
+          <p:cNvPr id="4" name="Text Placeholder 3"/>
+          <p:cNvSpPr>
+            <a:spLocks noGrp="1"/>
+          </p:cNvSpPr>
+          <p:nvPr>
+            <p:ph idx="2" sz="half" type="body"/>
+          </p:nvPr>
+        </p:nvSpPr>
+        <p:spPr/>
+        <p:txBody>
+          <a:bodyPr/>
+          <a:lstStyle/>
+          <a:p>
+            <a:pPr lvl="0" indent="0" marL="0">
+              <a:buNone/>
+            </a:pPr>
+            <a:r>
+              <a:rPr/>
+              <a:t>Computer engineer from unmanned aerial vehicles to banking applications, from social media to mobile environments, surgeon robots to the vehicles that can park themselves with the innovations it produces. It changes our lives in every way.</a:t>
+            </a:r>
+          </a:p>
+        </p:txBody>
+      </p:sp>
+      <p:pic>
+        <p:nvPicPr>
+          <p:cNvPr descr="assets/yazılım1.jpg" id="0" name="Picture 1"/>
+          <p:cNvPicPr>
+            <a:picLocks noGrp="1" noChangeAspect="1"/>
+          </p:cNvPicPr>
+          <p:nvPr/>
+        </p:nvPicPr>
+        <p:blipFill>
+          <a:blip r:embed="rId2"/>
+          <a:stretch>
+            <a:fillRect/>
+          </a:stretch>
+        </p:blipFill>
+        <p:spPr bwMode="auto">
+          <a:xfrm>
+            <a:off x="3568700" y="431800"/>
+            <a:ext cx="5105400" cy="3403600"/>
+          </a:xfrm>
+          <a:prstGeom prst="rect">
+            <a:avLst/>
+          </a:prstGeom>
+          <a:noFill/>
+          <a:ln w="9525">
+            <a:noFill/>
+            <a:headEnd/>
+            <a:tailEnd/>
+          </a:ln>
+        </p:spPr>
+      </p:pic>
+      <p:sp>
+        <p:nvSpPr>
+          <p:cNvPr id="1" name="TextBox 3"/>
+          <p:cNvSpPr txBox="1"/>
+          <p:nvPr/>
+        </p:nvSpPr>
+        <p:spPr>
+          <a:xfrm>
+            <a:off x="3568700" y="4076700"/>
+            <a:ext cx="5105400" cy="508000"/>
+          </a:xfrm>
+          <a:prstGeom prst="rect">
+            <a:avLst/>
+          </a:prstGeom>
+          <a:noFill/>
+        </p:spPr>
+        <p:txBody>
+          <a:bodyPr/>
+          <a:lstStyle/>
+          <a:p>
+            <a:pPr lvl="0" indent="0" marL="0" algn="ctr">
+              <a:buNone/>
+            </a:pPr>
+            <a:r>
+              <a:rPr/>
+              <a:t>w:300 h:300px</a:t>
+            </a:r>
+          </a:p>
+        </p:txBody>
+      </p:sp>
+    </p:spTree>
+  </p:cSld>
+</p:sld>
+</file>
+
+<file path=ppt/slides/slide7.xml><?xml version="1.0" encoding="utf-8"?>
+<p:sld xmlns:a="http://schemas.openxmlformats.org/drawingml/2006/main" xmlns:r="http://schemas.openxmlformats.org/officeDocument/2006/relationships" xmlns:p="http://schemas.openxmlformats.org/presentationml/2006/main">
+  <p:cSld>
+    <p:spTree>
+      <p:nvGrpSpPr>
+        <p:cNvPr id="1" name=""/>
+        <p:cNvGrpSpPr/>
+        <p:nvPr/>
+      </p:nvGrpSpPr>
+      <p:grpSpPr>
+        <a:xfrm>
+          <a:off x="0" y="0"/>
+          <a:ext cx="0" cy="0"/>
+          <a:chOff x="0" y="0"/>
+          <a:chExt cx="0" cy="0"/>
+        </a:xfrm>
+      </p:grpSpPr>
+      <p:sp>
+        <p:nvSpPr>
+          <p:cNvPr id="3" name="Content Placeholder 2"/>
+          <p:cNvSpPr>
+            <a:spLocks noGrp="1"/>
+          </p:cNvSpPr>
+          <p:nvPr>
+            <p:ph idx="1"/>
+          </p:nvPr>
+        </p:nvSpPr>
+        <p:spPr/>
+        <p:txBody>
+          <a:bodyPr/>
+          <a:lstStyle/>
+          <a:p>
+            <a:pPr lvl="0" indent="0" marL="0">
+              <a:buNone/>
+            </a:pPr>
+            <a:r>
+              <a:rPr/>
+              <a:t> w:300 h:300px w:300 h:300px</a:t>
+            </a:r>
+          </a:p>
+        </p:txBody>
+      </p:sp>
+    </p:spTree>
+  </p:cSld>
+</p:sld>
+</file>
+
+<file path=ppt/slides/slide8.xml><?xml version="1.0" encoding="utf-8"?>
+<p:sld xmlns:a="http://schemas.openxmlformats.org/drawingml/2006/main" xmlns:r="http://schemas.openxmlformats.org/officeDocument/2006/relationships" xmlns:p="http://schemas.openxmlformats.org/presentationml/2006/main">
+  <p:cSld>
+    <p:spTree>
+      <p:nvGrpSpPr>
+        <p:cNvPr id="1" name=""/>
+        <p:cNvGrpSpPr/>
+        <p:nvPr/>
+      </p:nvGrpSpPr>
+      <p:grpSpPr>
+        <a:xfrm>
+          <a:off x="0" y="0"/>
+          <a:ext cx="0" cy="0"/>
+          <a:chOff x="0" y="0"/>
+          <a:chExt cx="0" cy="0"/>
+        </a:xfrm>
+      </p:grpSpPr>
+      <p:sp>
+        <p:nvSpPr>
+          <p:cNvPr id="2" name="Title 1"/>
+          <p:cNvSpPr>
+            <a:spLocks noGrp="1"/>
+          </p:cNvSpPr>
+          <p:nvPr>
+            <p:ph type="title"/>
+          </p:nvPr>
+        </p:nvSpPr>
+        <p:spPr/>
+        <p:txBody>
+          <a:bodyPr/>
+          <a:lstStyle/>
+          <a:p>
+            <a:pPr lvl="0" indent="0" marL="0">
+              <a:buNone/>
+            </a:pPr>
+            <a:r>
+              <a:rPr/>
+              <a:t>Requirements to Become a Successful Computer Engineer</a:t>
+            </a:r>
+          </a:p>
+        </p:txBody>
+      </p:sp>
+      <p:sp>
+        <p:nvSpPr>
+          <p:cNvPr id="3" name="Content Placeholder 2"/>
+          <p:cNvSpPr>
+            <a:spLocks noGrp="1"/>
+          </p:cNvSpPr>
+          <p:nvPr>
+            <p:ph idx="1"/>
+          </p:nvPr>
+        </p:nvSpPr>
+        <p:spPr/>
+        <p:txBody>
+          <a:bodyPr/>
+          <a:lstStyle/>
+          <a:p>
+            <a:pPr lvl="0"/>
+            <a:r>
+              <a:rPr/>
+              <a:t>Mathematical acumen and problem solving ability</a:t>
+            </a:r>
+          </a:p>
+          <a:p>
+            <a:pPr lvl="0"/>
+            <a:r>
+              <a:rPr/>
+              <a:t>Creativity</a:t>
+            </a:r>
+          </a:p>
+          <a:p>
+            <a:pPr lvl="0"/>
+            <a:r>
+              <a:rPr/>
+              <a:t>Predisposition to Teamwork</a:t>
+            </a:r>
+          </a:p>
+          <a:p>
+            <a:pPr lvl="0"/>
+            <a:r>
+              <a:rPr/>
+              <a:t>Communicate Effectively and Take Responsibility</a:t>
+            </a:r>
+          </a:p>
+        </p:txBody>
+      </p:sp>
+    </p:spTree>
+  </p:cSld>
+</p:sld>
+</file>
+
+<file path=ppt/slides/slide9.xml><?xml version="1.0" encoding="utf-8"?>
+<p:sld xmlns:a="http://schemas.openxmlformats.org/drawingml/2006/main" xmlns:r="http://schemas.openxmlformats.org/officeDocument/2006/relationships" xmlns:p="http://schemas.openxmlformats.org/presentationml/2006/main">
+  <p:cSld>
+    <p:spTree>
+      <p:nvGrpSpPr>
+        <p:cNvPr id="1" name=""/>
+        <p:cNvGrpSpPr/>
+        <p:nvPr/>
+      </p:nvGrpSpPr>
+      <p:grpSpPr>
+        <a:xfrm>
+          <a:off x="0" y="0"/>
+          <a:ext cx="0" cy="0"/>
+          <a:chOff x="0" y="0"/>
+          <a:chExt cx="0" cy="0"/>
+        </a:xfrm>
+      </p:grpSpPr>
+      <p:sp>
+        <p:nvSpPr>
+          <p:cNvPr id="4" name="Text Placeholder 3"/>
+          <p:cNvSpPr>
+            <a:spLocks noGrp="1"/>
+          </p:cNvSpPr>
+          <p:nvPr>
+            <p:ph idx="2" sz="half" type="body"/>
+          </p:nvPr>
+        </p:nvSpPr>
+        <p:spPr/>
+        <p:txBody>
+          <a:bodyPr/>
+          <a:lstStyle/>
+          <a:p>
+            <a:pPr lvl="0" indent="0" marL="0">
+              <a:spcBef>
+                <a:spcPts val="3000"/>
+              </a:spcBef>
+              <a:buNone/>
+            </a:pPr>
+            <a:r>
+              <a:rPr b="1"/>
+              <a:t>Which Can Work in Institutions</a:t>
+            </a:r>
+          </a:p>
+          <a:p>
+            <a:pPr lvl="0"/>
+            <a:r>
+              <a:rPr/>
+              <a:t>Information for defense industry and military institutions</a:t>
+            </a:r>
+            <a:br/>
+          </a:p>
+          <a:p>
+            <a:pPr lvl="0"/>
+            <a:r>
+              <a:rPr/>
+              <a:t>Hospital information system automation</a:t>
+            </a:r>
+          </a:p>
+          <a:p>
+            <a:pPr lvl="0"/>
+            <a:r>
+              <a:rPr/>
+              <a:t>Finance and banking systems</a:t>
+            </a:r>
+          </a:p>
+          <a:p>
+            <a:pPr lvl="0"/>
+            <a:r>
+              <a:rPr/>
+              <a:t>Sectors such as automotive, white goods, textile computer aided manufacturing systems</a:t>
+            </a:r>
+          </a:p>
+          <a:p>
+            <a:pPr lvl="0"/>
+            <a:r>
+              <a:rPr/>
+              <a:t>Entertainment industry</a:t>
+            </a:r>
+          </a:p>
+          <a:p>
+            <a:pPr lvl="0"/>
+            <a:r>
+              <a:rPr/>
+              <a:t>Universities and research centers</a:t>
+            </a:r>
+          </a:p>
+          <a:p>
+            <a:pPr lvl="0"/>
+            <a:r>
+              <a:rPr/>
+              <a:t>…</a:t>
+            </a:r>
+          </a:p>
+        </p:txBody>
+      </p:sp>
+      <p:pic>
+        <p:nvPicPr>
+          <p:cNvPr descr="fig:  assets/yazılım1.jpg" id="0" name="Picture 1"/>
+          <p:cNvPicPr>
+            <a:picLocks noGrp="1" noChangeAspect="1"/>
+          </p:cNvPicPr>
+          <p:nvPr/>
+        </p:nvPicPr>
+        <p:blipFill>
+          <a:blip r:embed="rId2"/>
+          <a:stretch>
+            <a:fillRect/>
+          </a:stretch>
+        </p:blipFill>
+        <p:spPr bwMode="auto">
+          <a:xfrm>
+            <a:off x="3568700" y="431800"/>
+            <a:ext cx="5105400" cy="3403600"/>
+          </a:xfrm>
+          <a:prstGeom prst="rect">
+            <a:avLst/>
+          </a:prstGeom>
+          <a:noFill/>
+          <a:ln w="9525">
+            <a:noFill/>
+            <a:headEnd/>
+            <a:tailEnd/>
+          </a:ln>
+        </p:spPr>
+      </p:pic>
+      <p:sp>
+        <p:nvSpPr>
+          <p:cNvPr id="1" name="TextBox 3"/>
+          <p:cNvSpPr txBox="1"/>
+          <p:nvPr/>
+        </p:nvSpPr>
+        <p:spPr>
+          <a:xfrm>
+            <a:off x="3568700" y="4076700"/>
+            <a:ext cx="5105400" cy="508000"/>
+          </a:xfrm>
+          <a:prstGeom prst="rect">
+            <a:avLst/>
+          </a:prstGeom>
+          <a:noFill/>
+        </p:spPr>
+        <p:txBody>
+          <a:bodyPr/>
+          <a:lstStyle/>
+          <a:p>
+            <a:pPr lvl="0" indent="0" marL="0" algn="ctr">
+              <a:buNone/>
+            </a:pPr>
+            <a:r>
+              <a:rPr/>
+              <a:t>bg right:40% h:280px</a:t>
+            </a:r>
+          </a:p>
+        </p:txBody>
+      </p:sp>
+    </p:spTree>
+  </p:cSld>
+</p:sld>
 </file>
 
 <file path=ppt/theme/theme1.xml><?xml version="1.0" encoding="utf-8"?>

</xml_diff>